<commit_message>
Edits for removing Liberty references
</commit_message>
<xml_diff>
--- a/docs/images/common/zowe-install-location.pptx
+++ b/docs/images/common/zowe-install-location.pptx
@@ -243,7 +243,7 @@
           <a:p>
             <a:fld id="{843F0129-DD94-4C03-A30E-A726D6D39BAE}" type="datetimeFigureOut">
               <a:rPr lang="en-US" smtClean="0"/>
-              <a:t>8/9/2018</a:t>
+              <a:t>1/15/2019</a:t>
             </a:fld>
             <a:endParaRPr lang="en-US"/>
           </a:p>
@@ -413,7 +413,7 @@
           <a:p>
             <a:fld id="{843F0129-DD94-4C03-A30E-A726D6D39BAE}" type="datetimeFigureOut">
               <a:rPr lang="en-US" smtClean="0"/>
-              <a:t>8/9/2018</a:t>
+              <a:t>1/15/2019</a:t>
             </a:fld>
             <a:endParaRPr lang="en-US"/>
           </a:p>
@@ -593,7 +593,7 @@
           <a:p>
             <a:fld id="{843F0129-DD94-4C03-A30E-A726D6D39BAE}" type="datetimeFigureOut">
               <a:rPr lang="en-US" smtClean="0"/>
-              <a:t>8/9/2018</a:t>
+              <a:t>1/15/2019</a:t>
             </a:fld>
             <a:endParaRPr lang="en-US"/>
           </a:p>
@@ -763,7 +763,7 @@
           <a:p>
             <a:fld id="{843F0129-DD94-4C03-A30E-A726D6D39BAE}" type="datetimeFigureOut">
               <a:rPr lang="en-US" smtClean="0"/>
-              <a:t>8/9/2018</a:t>
+              <a:t>1/15/2019</a:t>
             </a:fld>
             <a:endParaRPr lang="en-US"/>
           </a:p>
@@ -1007,7 +1007,7 @@
           <a:p>
             <a:fld id="{843F0129-DD94-4C03-A30E-A726D6D39BAE}" type="datetimeFigureOut">
               <a:rPr lang="en-US" smtClean="0"/>
-              <a:t>8/9/2018</a:t>
+              <a:t>1/15/2019</a:t>
             </a:fld>
             <a:endParaRPr lang="en-US"/>
           </a:p>
@@ -1239,7 +1239,7 @@
           <a:p>
             <a:fld id="{843F0129-DD94-4C03-A30E-A726D6D39BAE}" type="datetimeFigureOut">
               <a:rPr lang="en-US" smtClean="0"/>
-              <a:t>8/9/2018</a:t>
+              <a:t>1/15/2019</a:t>
             </a:fld>
             <a:endParaRPr lang="en-US"/>
           </a:p>
@@ -1606,7 +1606,7 @@
           <a:p>
             <a:fld id="{843F0129-DD94-4C03-A30E-A726D6D39BAE}" type="datetimeFigureOut">
               <a:rPr lang="en-US" smtClean="0"/>
-              <a:t>8/9/2018</a:t>
+              <a:t>1/15/2019</a:t>
             </a:fld>
             <a:endParaRPr lang="en-US"/>
           </a:p>
@@ -1724,7 +1724,7 @@
           <a:p>
             <a:fld id="{843F0129-DD94-4C03-A30E-A726D6D39BAE}" type="datetimeFigureOut">
               <a:rPr lang="en-US" smtClean="0"/>
-              <a:t>8/9/2018</a:t>
+              <a:t>1/15/2019</a:t>
             </a:fld>
             <a:endParaRPr lang="en-US"/>
           </a:p>
@@ -1819,7 +1819,7 @@
           <a:p>
             <a:fld id="{843F0129-DD94-4C03-A30E-A726D6D39BAE}" type="datetimeFigureOut">
               <a:rPr lang="en-US" smtClean="0"/>
-              <a:t>8/9/2018</a:t>
+              <a:t>1/15/2019</a:t>
             </a:fld>
             <a:endParaRPr lang="en-US"/>
           </a:p>
@@ -2096,7 +2096,7 @@
           <a:p>
             <a:fld id="{843F0129-DD94-4C03-A30E-A726D6D39BAE}" type="datetimeFigureOut">
               <a:rPr lang="en-US" smtClean="0"/>
-              <a:t>8/9/2018</a:t>
+              <a:t>1/15/2019</a:t>
             </a:fld>
             <a:endParaRPr lang="en-US"/>
           </a:p>
@@ -2353,7 +2353,7 @@
           <a:p>
             <a:fld id="{843F0129-DD94-4C03-A30E-A726D6D39BAE}" type="datetimeFigureOut">
               <a:rPr lang="en-US" smtClean="0"/>
-              <a:t>8/9/2018</a:t>
+              <a:t>1/15/2019</a:t>
             </a:fld>
             <a:endParaRPr lang="en-US"/>
           </a:p>
@@ -2566,7 +2566,7 @@
           <a:p>
             <a:fld id="{843F0129-DD94-4C03-A30E-A726D6D39BAE}" type="datetimeFigureOut">
               <a:rPr lang="en-US" smtClean="0"/>
-              <a:t>8/9/2018</a:t>
+              <a:t>1/15/2019</a:t>
             </a:fld>
             <a:endParaRPr lang="en-US"/>
           </a:p>
@@ -3012,13 +3012,13 @@
               <a:avLst/>
             </a:prstGeom>
             <a:solidFill>
-              <a:schemeClr val="bg2"/>
+              <a:schemeClr val="bg1">
+                <a:lumMod val="95000"/>
+              </a:schemeClr>
             </a:solidFill>
             <a:ln>
               <a:solidFill>
-                <a:schemeClr val="bg2">
-                  <a:lumMod val="90000"/>
-                </a:schemeClr>
+                <a:schemeClr val="accent1"/>
               </a:solidFill>
             </a:ln>
           </p:spPr>
@@ -3043,7 +3043,7 @@
             <a:lstStyle/>
             <a:p>
               <a:pPr algn="ctr"/>
-              <a:endParaRPr lang="en-US" sz="800"/>
+              <a:endParaRPr lang="en-US" sz="800" dirty="0"/>
             </a:p>
           </p:txBody>
         </p:sp>
@@ -3068,13 +3068,13 @@
               <a:avLst/>
             </a:prstGeom>
             <a:solidFill>
-              <a:schemeClr val="bg2"/>
+              <a:schemeClr val="bg1">
+                <a:lumMod val="95000"/>
+              </a:schemeClr>
             </a:solidFill>
             <a:ln>
               <a:solidFill>
-                <a:schemeClr val="bg2">
-                  <a:lumMod val="90000"/>
-                </a:schemeClr>
+                <a:schemeClr val="accent1"/>
               </a:solidFill>
             </a:ln>
           </p:spPr>
@@ -3099,7 +3099,7 @@
             <a:lstStyle/>
             <a:p>
               <a:pPr algn="ctr"/>
-              <a:endParaRPr lang="en-US" sz="800"/>
+              <a:endParaRPr lang="en-US" sz="800" dirty="0"/>
             </a:p>
           </p:txBody>
         </p:sp>
@@ -3204,7 +3204,7 @@
                   <a:latin typeface="Arial" panose="020B0604020202020204" pitchFamily="34" charset="0"/>
                   <a:cs typeface="Arial" panose="020B0604020202020204" pitchFamily="34" charset="0"/>
                 </a:rPr>
-                <a:t>API Mediation</a:t>
+                <a:t>API Mediation Layer</a:t>
               </a:r>
             </a:p>
           </p:txBody>
@@ -3310,7 +3310,7 @@
                   <a:latin typeface="Arial" panose="020B0604020202020204" pitchFamily="34" charset="0"/>
                   <a:cs typeface="Arial" panose="020B0604020202020204" pitchFamily="34" charset="0"/>
                 </a:rPr>
-                <a:t>zLUX</a:t>
+                <a:t>Zowe Application Framework</a:t>
               </a:r>
             </a:p>
           </p:txBody>
@@ -3381,7 +3381,7 @@
                   <a:latin typeface="Arial" panose="020B0604020202020204" pitchFamily="34" charset="0"/>
                   <a:cs typeface="Arial" panose="020B0604020202020204" pitchFamily="34" charset="0"/>
                 </a:rPr>
-                <a:t>Explorer server</a:t>
+                <a:t>z/OS Services</a:t>
               </a:r>
             </a:p>
           </p:txBody>

</xml_diff>